<commit_message>
Replace image with CC version
</commit_message>
<xml_diff>
--- a/units/2/lessons/1/resources/petascale-lesson-2.1-slides.pptx
+++ b/units/2/lessons/1/resources/petascale-lesson-2.1-slides.pptx
@@ -121,7 +121,7 @@
       <p15:sldGuideLst xmlns:p15="http://schemas.microsoft.com/office/powerpoint/2012/main"/>
     </p:ext>
     <p:ext uri="http://customooxmlschemas.google.com/">
-      <go:slidesCustomData xmlns="" xmlns:p15="http://schemas.microsoft.com/office/powerpoint/2012/main" xmlns:go="http://customooxmlschemas.google.com/" roundtripDataSignature="AMtx7mhjSgRlE9C6u6EdzSfIjC8I+/qzYg==" r:id="rId16"/>
+      <go:slidesCustomData xmlns:go="http://customooxmlschemas.google.com/" xmlns:p15="http://schemas.microsoft.com/office/powerpoint/2012/main" xmlns="" roundtripDataSignature="AMtx7mhjSgRlE9C6u6EdzSfIjC8I+/qzYg==" r:id="rId16"/>
     </p:ext>
   </p:extLst>
 </p:presentation>
@@ -131,57 +131,6 @@
 <p:cmAuthorLst xmlns:a="http://schemas.openxmlformats.org/drawingml/2006/main" xmlns:r="http://schemas.openxmlformats.org/officeDocument/2006/relationships" xmlns:p="http://schemas.openxmlformats.org/presentationml/2006/main">
   <p:cmAuthor id="0" name="Anonymous" initials="" lastIdx="3" clrIdx="0"/>
 </p:cmAuthorLst>
-</file>
-
-<file path=ppt/comments/comment1.xml><?xml version="1.0" encoding="utf-8"?>
-<p:cmLst xmlns:a="http://schemas.openxmlformats.org/drawingml/2006/main" xmlns:r="http://schemas.openxmlformats.org/officeDocument/2006/relationships" xmlns:p="http://schemas.openxmlformats.org/presentationml/2006/main">
-  <p:cm authorId="0" dt="2020-06-27T22:22:15.796" idx="1">
-    <p:pos x="2936" y="3480"/>
-    <p:text>The symbol next to this term is showing as a question mark in a box. Is that what should be showing?</p:text>
-    <p:extLst>
-      <p:ext uri="{C676402C-5697-4E1C-873F-D02D1690AC5C}">
-        <p15:threadingInfo xmlns:p15="http://schemas.microsoft.com/office/powerpoint/2012/main" timeZoneBias="0"/>
-      </p:ext>
-      <p:ext uri="http://customooxmlschemas.google.com/">
-        <go:slidesCustomData xmlns="" xmlns:p15="http://schemas.microsoft.com/office/powerpoint/2012/main" xmlns:go="http://customooxmlschemas.google.com/" commentPostId="AAAAGq7_CV0"/>
-      </p:ext>
-    </p:extLst>
-  </p:cm>
-</p:cmLst>
-</file>
-
-<file path=ppt/comments/comment2.xml><?xml version="1.0" encoding="utf-8"?>
-<p:cmLst xmlns:a="http://schemas.openxmlformats.org/drawingml/2006/main" xmlns:r="http://schemas.openxmlformats.org/officeDocument/2006/relationships" xmlns:p="http://schemas.openxmlformats.org/presentationml/2006/main">
-  <p:cm authorId="0" dt="2020-06-27T22:25:39.723" idx="2">
-    <p:pos x="3677" y="1219"/>
-    <p:text>Maybe add a little more detail to this slide.</p:text>
-    <p:extLst>
-      <p:ext uri="{C676402C-5697-4E1C-873F-D02D1690AC5C}">
-        <p15:threadingInfo xmlns:p15="http://schemas.microsoft.com/office/powerpoint/2012/main" timeZoneBias="0"/>
-      </p:ext>
-      <p:ext uri="http://customooxmlschemas.google.com/">
-        <go:slidesCustomData xmlns="" xmlns:p15="http://schemas.microsoft.com/office/powerpoint/2012/main" xmlns:go="http://customooxmlschemas.google.com/" commentPostId="AAAAGq7_CWM"/>
-      </p:ext>
-    </p:extLst>
-  </p:cm>
-</p:cmLst>
-</file>
-
-<file path=ppt/comments/comment3.xml><?xml version="1.0" encoding="utf-8"?>
-<p:cmLst xmlns:a="http://schemas.openxmlformats.org/drawingml/2006/main" xmlns:r="http://schemas.openxmlformats.org/officeDocument/2006/relationships" xmlns:p="http://schemas.openxmlformats.org/presentationml/2006/main">
-  <p:cm authorId="0" dt="2020-06-27T22:24:34.952" idx="3">
-    <p:pos x="2333" y="470"/>
-    <p:text>I might suggest to write the summary slightly different, since it is basically just a copy of the outline slide. Summarize it in a reworded way.</p:text>
-    <p:extLst>
-      <p:ext uri="{C676402C-5697-4E1C-873F-D02D1690AC5C}">
-        <p15:threadingInfo xmlns:p15="http://schemas.microsoft.com/office/powerpoint/2012/main" timeZoneBias="0"/>
-      </p:ext>
-      <p:ext uri="http://customooxmlschemas.google.com/">
-        <go:slidesCustomData xmlns="" xmlns:p15="http://schemas.microsoft.com/office/powerpoint/2012/main" xmlns:go="http://customooxmlschemas.google.com/" commentPostId="AAAAGq7_CWE"/>
-      </p:ext>
-    </p:extLst>
-  </p:cm>
-</p:cmLst>
 </file>
 
 <file path=ppt/notesMasters/notesMaster1.xml><?xml version="1.0" encoding="utf-8"?>
@@ -266,7 +215,7 @@
           <a:p>
             <a:fld id="{5CBF2A87-9387-EB42-B173-5ABD7500A47C}" type="datetimeFigureOut">
               <a:rPr lang="en-US" smtClean="0"/>
-              <a:t>10/11/20</a:t>
+              <a:t>11/16/20</a:t>
             </a:fld>
             <a:endParaRPr lang="en-US"/>
           </a:p>
@@ -1164,7 +1113,7 @@
           <p:cNvPr id="2" name="Title 1">
             <a:extLst>
               <a:ext uri="{FF2B5EF4-FFF2-40B4-BE49-F238E27FC236}">
-                <a16:creationId xmlns="" xmlns:a16="http://schemas.microsoft.com/office/drawing/2014/main" id="{4154FF00-6C1D-4547-8A0C-5087ACDA336B}"/>
+                <a16:creationId xmlns:a16="http://schemas.microsoft.com/office/drawing/2014/main" xmlns="" id="{4154FF00-6C1D-4547-8A0C-5087ACDA336B}"/>
               </a:ext>
             </a:extLst>
           </p:cNvPr>
@@ -1201,7 +1150,7 @@
           <p:cNvPr id="3" name="Subtitle 2">
             <a:extLst>
               <a:ext uri="{FF2B5EF4-FFF2-40B4-BE49-F238E27FC236}">
-                <a16:creationId xmlns="" xmlns:a16="http://schemas.microsoft.com/office/drawing/2014/main" id="{750EE6CE-15DD-614F-AB4A-E3A06297484D}"/>
+                <a16:creationId xmlns:a16="http://schemas.microsoft.com/office/drawing/2014/main" xmlns="" id="{750EE6CE-15DD-614F-AB4A-E3A06297484D}"/>
               </a:ext>
             </a:extLst>
           </p:cNvPr>
@@ -1271,7 +1220,7 @@
           <p:cNvPr id="4" name="Date Placeholder 3">
             <a:extLst>
               <a:ext uri="{FF2B5EF4-FFF2-40B4-BE49-F238E27FC236}">
-                <a16:creationId xmlns="" xmlns:a16="http://schemas.microsoft.com/office/drawing/2014/main" id="{DB7DEBA0-59D7-3C47-98D9-71CBD5EF029A}"/>
+                <a16:creationId xmlns:a16="http://schemas.microsoft.com/office/drawing/2014/main" xmlns="" id="{DB7DEBA0-59D7-3C47-98D9-71CBD5EF029A}"/>
               </a:ext>
             </a:extLst>
           </p:cNvPr>
@@ -1289,7 +1238,7 @@
           <a:p>
             <a:fld id="{E389AA9D-A245-8245-B1FA-F343E2C3F01D}" type="datetimeFigureOut">
               <a:rPr lang="en-US" smtClean="0"/>
-              <a:t>10/11/20</a:t>
+              <a:t>11/16/20</a:t>
             </a:fld>
             <a:endParaRPr lang="en-US"/>
           </a:p>
@@ -1300,7 +1249,7 @@
           <p:cNvPr id="5" name="Footer Placeholder 4">
             <a:extLst>
               <a:ext uri="{FF2B5EF4-FFF2-40B4-BE49-F238E27FC236}">
-                <a16:creationId xmlns="" xmlns:a16="http://schemas.microsoft.com/office/drawing/2014/main" id="{41F018F2-98BE-4843-BCC2-987D23BDDACA}"/>
+                <a16:creationId xmlns:a16="http://schemas.microsoft.com/office/drawing/2014/main" xmlns="" id="{41F018F2-98BE-4843-BCC2-987D23BDDACA}"/>
               </a:ext>
             </a:extLst>
           </p:cNvPr>
@@ -1325,7 +1274,7 @@
           <p:cNvPr id="6" name="Slide Number Placeholder 5">
             <a:extLst>
               <a:ext uri="{FF2B5EF4-FFF2-40B4-BE49-F238E27FC236}">
-                <a16:creationId xmlns="" xmlns:a16="http://schemas.microsoft.com/office/drawing/2014/main" id="{2947633B-CED6-9042-BCE5-20D730690570}"/>
+                <a16:creationId xmlns:a16="http://schemas.microsoft.com/office/drawing/2014/main" xmlns="" id="{2947633B-CED6-9042-BCE5-20D730690570}"/>
               </a:ext>
             </a:extLst>
           </p:cNvPr>
@@ -1384,7 +1333,7 @@
           <p:cNvPr id="2" name="Title 1">
             <a:extLst>
               <a:ext uri="{FF2B5EF4-FFF2-40B4-BE49-F238E27FC236}">
-                <a16:creationId xmlns="" xmlns:a16="http://schemas.microsoft.com/office/drawing/2014/main" id="{1145828A-6EA7-9B49-AF1C-45BCA8F1DB23}"/>
+                <a16:creationId xmlns:a16="http://schemas.microsoft.com/office/drawing/2014/main" xmlns="" id="{1145828A-6EA7-9B49-AF1C-45BCA8F1DB23}"/>
               </a:ext>
             </a:extLst>
           </p:cNvPr>
@@ -1412,7 +1361,7 @@
           <p:cNvPr id="3" name="Vertical Text Placeholder 2">
             <a:extLst>
               <a:ext uri="{FF2B5EF4-FFF2-40B4-BE49-F238E27FC236}">
-                <a16:creationId xmlns="" xmlns:a16="http://schemas.microsoft.com/office/drawing/2014/main" id="{AEA57A97-638C-2D4C-B984-B944923DCB75}"/>
+                <a16:creationId xmlns:a16="http://schemas.microsoft.com/office/drawing/2014/main" xmlns="" id="{AEA57A97-638C-2D4C-B984-B944923DCB75}"/>
               </a:ext>
             </a:extLst>
           </p:cNvPr>
@@ -1469,7 +1418,7 @@
           <p:cNvPr id="4" name="Date Placeholder 3">
             <a:extLst>
               <a:ext uri="{FF2B5EF4-FFF2-40B4-BE49-F238E27FC236}">
-                <a16:creationId xmlns="" xmlns:a16="http://schemas.microsoft.com/office/drawing/2014/main" id="{EBE56020-F746-FF46-8F8F-76EB174B2866}"/>
+                <a16:creationId xmlns:a16="http://schemas.microsoft.com/office/drawing/2014/main" xmlns="" id="{EBE56020-F746-FF46-8F8F-76EB174B2866}"/>
               </a:ext>
             </a:extLst>
           </p:cNvPr>
@@ -1487,7 +1436,7 @@
           <a:p>
             <a:fld id="{E389AA9D-A245-8245-B1FA-F343E2C3F01D}" type="datetimeFigureOut">
               <a:rPr lang="en-US" smtClean="0"/>
-              <a:t>10/11/20</a:t>
+              <a:t>11/16/20</a:t>
             </a:fld>
             <a:endParaRPr lang="en-US"/>
           </a:p>
@@ -1498,7 +1447,7 @@
           <p:cNvPr id="5" name="Footer Placeholder 4">
             <a:extLst>
               <a:ext uri="{FF2B5EF4-FFF2-40B4-BE49-F238E27FC236}">
-                <a16:creationId xmlns="" xmlns:a16="http://schemas.microsoft.com/office/drawing/2014/main" id="{1F8B489C-E6A8-5349-B3AB-41D4DF239ECF}"/>
+                <a16:creationId xmlns:a16="http://schemas.microsoft.com/office/drawing/2014/main" xmlns="" id="{1F8B489C-E6A8-5349-B3AB-41D4DF239ECF}"/>
               </a:ext>
             </a:extLst>
           </p:cNvPr>
@@ -1523,7 +1472,7 @@
           <p:cNvPr id="6" name="Slide Number Placeholder 5">
             <a:extLst>
               <a:ext uri="{FF2B5EF4-FFF2-40B4-BE49-F238E27FC236}">
-                <a16:creationId xmlns="" xmlns:a16="http://schemas.microsoft.com/office/drawing/2014/main" id="{C6B8E5CF-9F22-7347-9597-A71F500254A6}"/>
+                <a16:creationId xmlns:a16="http://schemas.microsoft.com/office/drawing/2014/main" xmlns="" id="{C6B8E5CF-9F22-7347-9597-A71F500254A6}"/>
               </a:ext>
             </a:extLst>
           </p:cNvPr>
@@ -1582,7 +1531,7 @@
           <p:cNvPr id="2" name="Vertical Title 1">
             <a:extLst>
               <a:ext uri="{FF2B5EF4-FFF2-40B4-BE49-F238E27FC236}">
-                <a16:creationId xmlns="" xmlns:a16="http://schemas.microsoft.com/office/drawing/2014/main" id="{FDACEA32-B942-2248-B85F-572F92F0A9F0}"/>
+                <a16:creationId xmlns:a16="http://schemas.microsoft.com/office/drawing/2014/main" xmlns="" id="{FDACEA32-B942-2248-B85F-572F92F0A9F0}"/>
               </a:ext>
             </a:extLst>
           </p:cNvPr>
@@ -1615,7 +1564,7 @@
           <p:cNvPr id="3" name="Vertical Text Placeholder 2">
             <a:extLst>
               <a:ext uri="{FF2B5EF4-FFF2-40B4-BE49-F238E27FC236}">
-                <a16:creationId xmlns="" xmlns:a16="http://schemas.microsoft.com/office/drawing/2014/main" id="{4BB564C5-497A-744B-819E-B6649B83A81D}"/>
+                <a16:creationId xmlns:a16="http://schemas.microsoft.com/office/drawing/2014/main" xmlns="" id="{4BB564C5-497A-744B-819E-B6649B83A81D}"/>
               </a:ext>
             </a:extLst>
           </p:cNvPr>
@@ -1677,7 +1626,7 @@
           <p:cNvPr id="4" name="Date Placeholder 3">
             <a:extLst>
               <a:ext uri="{FF2B5EF4-FFF2-40B4-BE49-F238E27FC236}">
-                <a16:creationId xmlns="" xmlns:a16="http://schemas.microsoft.com/office/drawing/2014/main" id="{EE709782-4DE3-2347-BA98-0C3372D9F652}"/>
+                <a16:creationId xmlns:a16="http://schemas.microsoft.com/office/drawing/2014/main" xmlns="" id="{EE709782-4DE3-2347-BA98-0C3372D9F652}"/>
               </a:ext>
             </a:extLst>
           </p:cNvPr>
@@ -1695,7 +1644,7 @@
           <a:p>
             <a:fld id="{E389AA9D-A245-8245-B1FA-F343E2C3F01D}" type="datetimeFigureOut">
               <a:rPr lang="en-US" smtClean="0"/>
-              <a:t>10/11/20</a:t>
+              <a:t>11/16/20</a:t>
             </a:fld>
             <a:endParaRPr lang="en-US"/>
           </a:p>
@@ -1706,7 +1655,7 @@
           <p:cNvPr id="5" name="Footer Placeholder 4">
             <a:extLst>
               <a:ext uri="{FF2B5EF4-FFF2-40B4-BE49-F238E27FC236}">
-                <a16:creationId xmlns="" xmlns:a16="http://schemas.microsoft.com/office/drawing/2014/main" id="{8625CD21-2409-1440-980D-CF27E5CEB256}"/>
+                <a16:creationId xmlns:a16="http://schemas.microsoft.com/office/drawing/2014/main" xmlns="" id="{8625CD21-2409-1440-980D-CF27E5CEB256}"/>
               </a:ext>
             </a:extLst>
           </p:cNvPr>
@@ -1731,7 +1680,7 @@
           <p:cNvPr id="6" name="Slide Number Placeholder 5">
             <a:extLst>
               <a:ext uri="{FF2B5EF4-FFF2-40B4-BE49-F238E27FC236}">
-                <a16:creationId xmlns="" xmlns:a16="http://schemas.microsoft.com/office/drawing/2014/main" id="{E41D5F59-DA90-3B4B-838D-6B96648F8B90}"/>
+                <a16:creationId xmlns:a16="http://schemas.microsoft.com/office/drawing/2014/main" xmlns="" id="{E41D5F59-DA90-3B4B-838D-6B96648F8B90}"/>
               </a:ext>
             </a:extLst>
           </p:cNvPr>
@@ -1906,7 +1855,7 @@
                 </a:solidFill>
               </a:rPr>
               <a:pPr/>
-              <a:t>10/11/20</a:t>
+              <a:t>11/16/20</a:t>
             </a:fld>
             <a:endParaRPr lang="en-US">
               <a:solidFill>
@@ -2104,7 +2053,7 @@
                 </a:solidFill>
               </a:rPr>
               <a:pPr/>
-              <a:t>10/11/20</a:t>
+              <a:t>11/16/20</a:t>
             </a:fld>
             <a:endParaRPr lang="en-US">
               <a:solidFill>
@@ -2378,7 +2327,7 @@
                 </a:solidFill>
               </a:rPr>
               <a:pPr/>
-              <a:t>10/11/20</a:t>
+              <a:t>11/16/20</a:t>
             </a:fld>
             <a:endParaRPr lang="en-US">
               <a:solidFill>
@@ -2638,7 +2587,7 @@
                 </a:solidFill>
               </a:rPr>
               <a:pPr/>
-              <a:t>10/11/20</a:t>
+              <a:t>11/16/20</a:t>
             </a:fld>
             <a:endParaRPr lang="en-US">
               <a:solidFill>
@@ -3033,7 +2982,7 @@
                 </a:solidFill>
               </a:rPr>
               <a:pPr/>
-              <a:t>10/11/20</a:t>
+              <a:t>11/16/20</a:t>
             </a:fld>
             <a:endParaRPr lang="en-US">
               <a:solidFill>
@@ -3179,7 +3128,7 @@
                 </a:solidFill>
               </a:rPr>
               <a:pPr/>
-              <a:t>10/11/20</a:t>
+              <a:t>11/16/20</a:t>
             </a:fld>
             <a:endParaRPr lang="en-US">
               <a:solidFill>
@@ -3302,7 +3251,7 @@
                 </a:solidFill>
               </a:rPr>
               <a:pPr/>
-              <a:t>10/11/20</a:t>
+              <a:t>11/16/20</a:t>
             </a:fld>
             <a:endParaRPr lang="en-US">
               <a:solidFill>
@@ -3607,7 +3556,7 @@
                 </a:solidFill>
               </a:rPr>
               <a:pPr/>
-              <a:t>10/11/20</a:t>
+              <a:t>11/16/20</a:t>
             </a:fld>
             <a:endParaRPr lang="en-US">
               <a:solidFill>
@@ -3711,7 +3660,7 @@
           <p:cNvPr id="2" name="Title 1">
             <a:extLst>
               <a:ext uri="{FF2B5EF4-FFF2-40B4-BE49-F238E27FC236}">
-                <a16:creationId xmlns="" xmlns:a16="http://schemas.microsoft.com/office/drawing/2014/main" id="{2E55494D-DDAA-DB44-ACDD-045F4E2CCEA4}"/>
+                <a16:creationId xmlns:a16="http://schemas.microsoft.com/office/drawing/2014/main" xmlns="" id="{2E55494D-DDAA-DB44-ACDD-045F4E2CCEA4}"/>
               </a:ext>
             </a:extLst>
           </p:cNvPr>
@@ -3739,7 +3688,7 @@
           <p:cNvPr id="3" name="Content Placeholder 2">
             <a:extLst>
               <a:ext uri="{FF2B5EF4-FFF2-40B4-BE49-F238E27FC236}">
-                <a16:creationId xmlns="" xmlns:a16="http://schemas.microsoft.com/office/drawing/2014/main" id="{1F709144-9CC0-3544-BCEC-A42596B9CCA7}"/>
+                <a16:creationId xmlns:a16="http://schemas.microsoft.com/office/drawing/2014/main" xmlns="" id="{1F709144-9CC0-3544-BCEC-A42596B9CCA7}"/>
               </a:ext>
             </a:extLst>
           </p:cNvPr>
@@ -3796,7 +3745,7 @@
           <p:cNvPr id="4" name="Date Placeholder 3">
             <a:extLst>
               <a:ext uri="{FF2B5EF4-FFF2-40B4-BE49-F238E27FC236}">
-                <a16:creationId xmlns="" xmlns:a16="http://schemas.microsoft.com/office/drawing/2014/main" id="{6524CB33-91E9-FA4E-A4C0-D91C60541C4C}"/>
+                <a16:creationId xmlns:a16="http://schemas.microsoft.com/office/drawing/2014/main" xmlns="" id="{6524CB33-91E9-FA4E-A4C0-D91C60541C4C}"/>
               </a:ext>
             </a:extLst>
           </p:cNvPr>
@@ -3814,7 +3763,7 @@
           <a:p>
             <a:fld id="{E389AA9D-A245-8245-B1FA-F343E2C3F01D}" type="datetimeFigureOut">
               <a:rPr lang="en-US" smtClean="0"/>
-              <a:t>10/11/20</a:t>
+              <a:t>11/16/20</a:t>
             </a:fld>
             <a:endParaRPr lang="en-US"/>
           </a:p>
@@ -3825,7 +3774,7 @@
           <p:cNvPr id="5" name="Footer Placeholder 4">
             <a:extLst>
               <a:ext uri="{FF2B5EF4-FFF2-40B4-BE49-F238E27FC236}">
-                <a16:creationId xmlns="" xmlns:a16="http://schemas.microsoft.com/office/drawing/2014/main" id="{E32AED04-7F27-3640-B823-C9284A132199}"/>
+                <a16:creationId xmlns:a16="http://schemas.microsoft.com/office/drawing/2014/main" xmlns="" id="{E32AED04-7F27-3640-B823-C9284A132199}"/>
               </a:ext>
             </a:extLst>
           </p:cNvPr>
@@ -3850,7 +3799,7 @@
           <p:cNvPr id="6" name="Slide Number Placeholder 5">
             <a:extLst>
               <a:ext uri="{FF2B5EF4-FFF2-40B4-BE49-F238E27FC236}">
-                <a16:creationId xmlns="" xmlns:a16="http://schemas.microsoft.com/office/drawing/2014/main" id="{1120C55E-E812-B246-84C8-6AEA2E402241}"/>
+                <a16:creationId xmlns:a16="http://schemas.microsoft.com/office/drawing/2014/main" xmlns="" id="{1120C55E-E812-B246-84C8-6AEA2E402241}"/>
               </a:ext>
             </a:extLst>
           </p:cNvPr>
@@ -4086,7 +4035,7 @@
                 </a:solidFill>
               </a:rPr>
               <a:pPr/>
-              <a:t>10/11/20</a:t>
+              <a:t>11/16/20</a:t>
             </a:fld>
             <a:endParaRPr lang="en-US">
               <a:solidFill>
@@ -4284,7 +4233,7 @@
                 </a:solidFill>
               </a:rPr>
               <a:pPr/>
-              <a:t>10/11/20</a:t>
+              <a:t>11/16/20</a:t>
             </a:fld>
             <a:endParaRPr lang="en-US">
               <a:solidFill>
@@ -4492,7 +4441,7 @@
                 </a:solidFill>
               </a:rPr>
               <a:pPr/>
-              <a:t>10/11/20</a:t>
+              <a:t>11/16/20</a:t>
             </a:fld>
             <a:endParaRPr lang="en-US">
               <a:solidFill>
@@ -4596,7 +4545,7 @@
           <p:cNvPr id="2" name="Title 1">
             <a:extLst>
               <a:ext uri="{FF2B5EF4-FFF2-40B4-BE49-F238E27FC236}">
-                <a16:creationId xmlns="" xmlns:a16="http://schemas.microsoft.com/office/drawing/2014/main" id="{0F55F23F-BDB1-7F4B-96FF-482840FD3CCE}"/>
+                <a16:creationId xmlns:a16="http://schemas.microsoft.com/office/drawing/2014/main" xmlns="" id="{0F55F23F-BDB1-7F4B-96FF-482840FD3CCE}"/>
               </a:ext>
             </a:extLst>
           </p:cNvPr>
@@ -4633,7 +4582,7 @@
           <p:cNvPr id="3" name="Text Placeholder 2">
             <a:extLst>
               <a:ext uri="{FF2B5EF4-FFF2-40B4-BE49-F238E27FC236}">
-                <a16:creationId xmlns="" xmlns:a16="http://schemas.microsoft.com/office/drawing/2014/main" id="{EB4FC190-4426-6C4C-9C97-06F967C8BCCD}"/>
+                <a16:creationId xmlns:a16="http://schemas.microsoft.com/office/drawing/2014/main" xmlns="" id="{EB4FC190-4426-6C4C-9C97-06F967C8BCCD}"/>
               </a:ext>
             </a:extLst>
           </p:cNvPr>
@@ -4758,7 +4707,7 @@
           <p:cNvPr id="4" name="Date Placeholder 3">
             <a:extLst>
               <a:ext uri="{FF2B5EF4-FFF2-40B4-BE49-F238E27FC236}">
-                <a16:creationId xmlns="" xmlns:a16="http://schemas.microsoft.com/office/drawing/2014/main" id="{81D5A383-BF63-8541-B54D-38CE5E3EE6A9}"/>
+                <a16:creationId xmlns:a16="http://schemas.microsoft.com/office/drawing/2014/main" xmlns="" id="{81D5A383-BF63-8541-B54D-38CE5E3EE6A9}"/>
               </a:ext>
             </a:extLst>
           </p:cNvPr>
@@ -4776,7 +4725,7 @@
           <a:p>
             <a:fld id="{E389AA9D-A245-8245-B1FA-F343E2C3F01D}" type="datetimeFigureOut">
               <a:rPr lang="en-US" smtClean="0"/>
-              <a:t>10/11/20</a:t>
+              <a:t>11/16/20</a:t>
             </a:fld>
             <a:endParaRPr lang="en-US"/>
           </a:p>
@@ -4787,7 +4736,7 @@
           <p:cNvPr id="5" name="Footer Placeholder 4">
             <a:extLst>
               <a:ext uri="{FF2B5EF4-FFF2-40B4-BE49-F238E27FC236}">
-                <a16:creationId xmlns="" xmlns:a16="http://schemas.microsoft.com/office/drawing/2014/main" id="{FE93493E-ADA5-814F-B39F-329605710B06}"/>
+                <a16:creationId xmlns:a16="http://schemas.microsoft.com/office/drawing/2014/main" xmlns="" id="{FE93493E-ADA5-814F-B39F-329605710B06}"/>
               </a:ext>
             </a:extLst>
           </p:cNvPr>
@@ -4812,7 +4761,7 @@
           <p:cNvPr id="6" name="Slide Number Placeholder 5">
             <a:extLst>
               <a:ext uri="{FF2B5EF4-FFF2-40B4-BE49-F238E27FC236}">
-                <a16:creationId xmlns="" xmlns:a16="http://schemas.microsoft.com/office/drawing/2014/main" id="{28F86D13-86AE-6B4B-A90C-4697DBD7E80B}"/>
+                <a16:creationId xmlns:a16="http://schemas.microsoft.com/office/drawing/2014/main" xmlns="" id="{28F86D13-86AE-6B4B-A90C-4697DBD7E80B}"/>
               </a:ext>
             </a:extLst>
           </p:cNvPr>
@@ -4871,7 +4820,7 @@
           <p:cNvPr id="2" name="Title 1">
             <a:extLst>
               <a:ext uri="{FF2B5EF4-FFF2-40B4-BE49-F238E27FC236}">
-                <a16:creationId xmlns="" xmlns:a16="http://schemas.microsoft.com/office/drawing/2014/main" id="{863FBF3B-02BD-E94D-9AF9-1ECEA3C20D1C}"/>
+                <a16:creationId xmlns:a16="http://schemas.microsoft.com/office/drawing/2014/main" xmlns="" id="{863FBF3B-02BD-E94D-9AF9-1ECEA3C20D1C}"/>
               </a:ext>
             </a:extLst>
           </p:cNvPr>
@@ -4899,7 +4848,7 @@
           <p:cNvPr id="3" name="Content Placeholder 2">
             <a:extLst>
               <a:ext uri="{FF2B5EF4-FFF2-40B4-BE49-F238E27FC236}">
-                <a16:creationId xmlns="" xmlns:a16="http://schemas.microsoft.com/office/drawing/2014/main" id="{7E11630E-DFF3-2045-9AB8-DCED929E3E82}"/>
+                <a16:creationId xmlns:a16="http://schemas.microsoft.com/office/drawing/2014/main" xmlns="" id="{7E11630E-DFF3-2045-9AB8-DCED929E3E82}"/>
               </a:ext>
             </a:extLst>
           </p:cNvPr>
@@ -4961,7 +4910,7 @@
           <p:cNvPr id="4" name="Content Placeholder 3">
             <a:extLst>
               <a:ext uri="{FF2B5EF4-FFF2-40B4-BE49-F238E27FC236}">
-                <a16:creationId xmlns="" xmlns:a16="http://schemas.microsoft.com/office/drawing/2014/main" id="{66DE622E-3E7E-E44D-9D98-9F8501CBB46A}"/>
+                <a16:creationId xmlns:a16="http://schemas.microsoft.com/office/drawing/2014/main" xmlns="" id="{66DE622E-3E7E-E44D-9D98-9F8501CBB46A}"/>
               </a:ext>
             </a:extLst>
           </p:cNvPr>
@@ -5023,7 +4972,7 @@
           <p:cNvPr id="5" name="Date Placeholder 4">
             <a:extLst>
               <a:ext uri="{FF2B5EF4-FFF2-40B4-BE49-F238E27FC236}">
-                <a16:creationId xmlns="" xmlns:a16="http://schemas.microsoft.com/office/drawing/2014/main" id="{2E079E84-DA1E-F249-A52A-74882E3EC639}"/>
+                <a16:creationId xmlns:a16="http://schemas.microsoft.com/office/drawing/2014/main" xmlns="" id="{2E079E84-DA1E-F249-A52A-74882E3EC639}"/>
               </a:ext>
             </a:extLst>
           </p:cNvPr>
@@ -5041,7 +4990,7 @@
           <a:p>
             <a:fld id="{E389AA9D-A245-8245-B1FA-F343E2C3F01D}" type="datetimeFigureOut">
               <a:rPr lang="en-US" smtClean="0"/>
-              <a:t>10/11/20</a:t>
+              <a:t>11/16/20</a:t>
             </a:fld>
             <a:endParaRPr lang="en-US"/>
           </a:p>
@@ -5052,7 +5001,7 @@
           <p:cNvPr id="6" name="Footer Placeholder 5">
             <a:extLst>
               <a:ext uri="{FF2B5EF4-FFF2-40B4-BE49-F238E27FC236}">
-                <a16:creationId xmlns="" xmlns:a16="http://schemas.microsoft.com/office/drawing/2014/main" id="{4A3F0287-C6A5-674A-B46B-F00DB8F853BD}"/>
+                <a16:creationId xmlns:a16="http://schemas.microsoft.com/office/drawing/2014/main" xmlns="" id="{4A3F0287-C6A5-674A-B46B-F00DB8F853BD}"/>
               </a:ext>
             </a:extLst>
           </p:cNvPr>
@@ -5077,7 +5026,7 @@
           <p:cNvPr id="7" name="Slide Number Placeholder 6">
             <a:extLst>
               <a:ext uri="{FF2B5EF4-FFF2-40B4-BE49-F238E27FC236}">
-                <a16:creationId xmlns="" xmlns:a16="http://schemas.microsoft.com/office/drawing/2014/main" id="{128186AF-674A-1C4A-9450-38659B9620A5}"/>
+                <a16:creationId xmlns:a16="http://schemas.microsoft.com/office/drawing/2014/main" xmlns="" id="{128186AF-674A-1C4A-9450-38659B9620A5}"/>
               </a:ext>
             </a:extLst>
           </p:cNvPr>
@@ -5136,7 +5085,7 @@
           <p:cNvPr id="2" name="Title 1">
             <a:extLst>
               <a:ext uri="{FF2B5EF4-FFF2-40B4-BE49-F238E27FC236}">
-                <a16:creationId xmlns="" xmlns:a16="http://schemas.microsoft.com/office/drawing/2014/main" id="{7DB30D2B-5168-CA4A-86CF-A25BEB1EDBC6}"/>
+                <a16:creationId xmlns:a16="http://schemas.microsoft.com/office/drawing/2014/main" xmlns="" id="{7DB30D2B-5168-CA4A-86CF-A25BEB1EDBC6}"/>
               </a:ext>
             </a:extLst>
           </p:cNvPr>
@@ -5169,7 +5118,7 @@
           <p:cNvPr id="3" name="Text Placeholder 2">
             <a:extLst>
               <a:ext uri="{FF2B5EF4-FFF2-40B4-BE49-F238E27FC236}">
-                <a16:creationId xmlns="" xmlns:a16="http://schemas.microsoft.com/office/drawing/2014/main" id="{CA79734B-93AE-5842-8B70-69618414F534}"/>
+                <a16:creationId xmlns:a16="http://schemas.microsoft.com/office/drawing/2014/main" xmlns="" id="{CA79734B-93AE-5842-8B70-69618414F534}"/>
               </a:ext>
             </a:extLst>
           </p:cNvPr>
@@ -5240,7 +5189,7 @@
           <p:cNvPr id="4" name="Content Placeholder 3">
             <a:extLst>
               <a:ext uri="{FF2B5EF4-FFF2-40B4-BE49-F238E27FC236}">
-                <a16:creationId xmlns="" xmlns:a16="http://schemas.microsoft.com/office/drawing/2014/main" id="{A9031B97-C934-1045-88FA-4E94833AF748}"/>
+                <a16:creationId xmlns:a16="http://schemas.microsoft.com/office/drawing/2014/main" xmlns="" id="{A9031B97-C934-1045-88FA-4E94833AF748}"/>
               </a:ext>
             </a:extLst>
           </p:cNvPr>
@@ -5302,7 +5251,7 @@
           <p:cNvPr id="5" name="Text Placeholder 4">
             <a:extLst>
               <a:ext uri="{FF2B5EF4-FFF2-40B4-BE49-F238E27FC236}">
-                <a16:creationId xmlns="" xmlns:a16="http://schemas.microsoft.com/office/drawing/2014/main" id="{93D495DD-79B5-5744-A957-9A2612EDF62A}"/>
+                <a16:creationId xmlns:a16="http://schemas.microsoft.com/office/drawing/2014/main" xmlns="" id="{93D495DD-79B5-5744-A957-9A2612EDF62A}"/>
               </a:ext>
             </a:extLst>
           </p:cNvPr>
@@ -5373,7 +5322,7 @@
           <p:cNvPr id="6" name="Content Placeholder 5">
             <a:extLst>
               <a:ext uri="{FF2B5EF4-FFF2-40B4-BE49-F238E27FC236}">
-                <a16:creationId xmlns="" xmlns:a16="http://schemas.microsoft.com/office/drawing/2014/main" id="{ADB235EC-2E08-F044-8030-C3023954BBA3}"/>
+                <a16:creationId xmlns:a16="http://schemas.microsoft.com/office/drawing/2014/main" xmlns="" id="{ADB235EC-2E08-F044-8030-C3023954BBA3}"/>
               </a:ext>
             </a:extLst>
           </p:cNvPr>
@@ -5435,7 +5384,7 @@
           <p:cNvPr id="7" name="Date Placeholder 6">
             <a:extLst>
               <a:ext uri="{FF2B5EF4-FFF2-40B4-BE49-F238E27FC236}">
-                <a16:creationId xmlns="" xmlns:a16="http://schemas.microsoft.com/office/drawing/2014/main" id="{4D129B26-2B38-1345-949B-44AE0FA8D010}"/>
+                <a16:creationId xmlns:a16="http://schemas.microsoft.com/office/drawing/2014/main" xmlns="" id="{4D129B26-2B38-1345-949B-44AE0FA8D010}"/>
               </a:ext>
             </a:extLst>
           </p:cNvPr>
@@ -5453,7 +5402,7 @@
           <a:p>
             <a:fld id="{E389AA9D-A245-8245-B1FA-F343E2C3F01D}" type="datetimeFigureOut">
               <a:rPr lang="en-US" smtClean="0"/>
-              <a:t>10/11/20</a:t>
+              <a:t>11/16/20</a:t>
             </a:fld>
             <a:endParaRPr lang="en-US"/>
           </a:p>
@@ -5464,7 +5413,7 @@
           <p:cNvPr id="8" name="Footer Placeholder 7">
             <a:extLst>
               <a:ext uri="{FF2B5EF4-FFF2-40B4-BE49-F238E27FC236}">
-                <a16:creationId xmlns="" xmlns:a16="http://schemas.microsoft.com/office/drawing/2014/main" id="{59466BBD-CF8A-9145-9AD1-9623F65CAC17}"/>
+                <a16:creationId xmlns:a16="http://schemas.microsoft.com/office/drawing/2014/main" xmlns="" id="{59466BBD-CF8A-9145-9AD1-9623F65CAC17}"/>
               </a:ext>
             </a:extLst>
           </p:cNvPr>
@@ -5489,7 +5438,7 @@
           <p:cNvPr id="9" name="Slide Number Placeholder 8">
             <a:extLst>
               <a:ext uri="{FF2B5EF4-FFF2-40B4-BE49-F238E27FC236}">
-                <a16:creationId xmlns="" xmlns:a16="http://schemas.microsoft.com/office/drawing/2014/main" id="{0B558038-9343-4C4F-B795-4B8EDC06F4AD}"/>
+                <a16:creationId xmlns:a16="http://schemas.microsoft.com/office/drawing/2014/main" xmlns="" id="{0B558038-9343-4C4F-B795-4B8EDC06F4AD}"/>
               </a:ext>
             </a:extLst>
           </p:cNvPr>
@@ -5548,7 +5497,7 @@
           <p:cNvPr id="2" name="Title 1">
             <a:extLst>
               <a:ext uri="{FF2B5EF4-FFF2-40B4-BE49-F238E27FC236}">
-                <a16:creationId xmlns="" xmlns:a16="http://schemas.microsoft.com/office/drawing/2014/main" id="{9B295A98-597F-1047-A7B2-1477A76FC890}"/>
+                <a16:creationId xmlns:a16="http://schemas.microsoft.com/office/drawing/2014/main" xmlns="" id="{9B295A98-597F-1047-A7B2-1477A76FC890}"/>
               </a:ext>
             </a:extLst>
           </p:cNvPr>
@@ -5576,7 +5525,7 @@
           <p:cNvPr id="3" name="Date Placeholder 2">
             <a:extLst>
               <a:ext uri="{FF2B5EF4-FFF2-40B4-BE49-F238E27FC236}">
-                <a16:creationId xmlns="" xmlns:a16="http://schemas.microsoft.com/office/drawing/2014/main" id="{D4B4B6B9-8B8D-EF4D-9BEB-EF1445053A6F}"/>
+                <a16:creationId xmlns:a16="http://schemas.microsoft.com/office/drawing/2014/main" xmlns="" id="{D4B4B6B9-8B8D-EF4D-9BEB-EF1445053A6F}"/>
               </a:ext>
             </a:extLst>
           </p:cNvPr>
@@ -5594,7 +5543,7 @@
           <a:p>
             <a:fld id="{E389AA9D-A245-8245-B1FA-F343E2C3F01D}" type="datetimeFigureOut">
               <a:rPr lang="en-US" smtClean="0"/>
-              <a:t>10/11/20</a:t>
+              <a:t>11/16/20</a:t>
             </a:fld>
             <a:endParaRPr lang="en-US"/>
           </a:p>
@@ -5605,7 +5554,7 @@
           <p:cNvPr id="4" name="Footer Placeholder 3">
             <a:extLst>
               <a:ext uri="{FF2B5EF4-FFF2-40B4-BE49-F238E27FC236}">
-                <a16:creationId xmlns="" xmlns:a16="http://schemas.microsoft.com/office/drawing/2014/main" id="{E0C47C1B-7F79-CF43-BA22-1AD4E162D7B0}"/>
+                <a16:creationId xmlns:a16="http://schemas.microsoft.com/office/drawing/2014/main" xmlns="" id="{E0C47C1B-7F79-CF43-BA22-1AD4E162D7B0}"/>
               </a:ext>
             </a:extLst>
           </p:cNvPr>
@@ -5630,7 +5579,7 @@
           <p:cNvPr id="5" name="Slide Number Placeholder 4">
             <a:extLst>
               <a:ext uri="{FF2B5EF4-FFF2-40B4-BE49-F238E27FC236}">
-                <a16:creationId xmlns="" xmlns:a16="http://schemas.microsoft.com/office/drawing/2014/main" id="{EFB81D42-E412-B148-B037-4741F744D552}"/>
+                <a16:creationId xmlns:a16="http://schemas.microsoft.com/office/drawing/2014/main" xmlns="" id="{EFB81D42-E412-B148-B037-4741F744D552}"/>
               </a:ext>
             </a:extLst>
           </p:cNvPr>
@@ -5689,7 +5638,7 @@
           <p:cNvPr id="2" name="Date Placeholder 1">
             <a:extLst>
               <a:ext uri="{FF2B5EF4-FFF2-40B4-BE49-F238E27FC236}">
-                <a16:creationId xmlns="" xmlns:a16="http://schemas.microsoft.com/office/drawing/2014/main" id="{3CC03EBA-A07F-7B44-8CA5-C7DB28AE95EF}"/>
+                <a16:creationId xmlns:a16="http://schemas.microsoft.com/office/drawing/2014/main" xmlns="" id="{3CC03EBA-A07F-7B44-8CA5-C7DB28AE95EF}"/>
               </a:ext>
             </a:extLst>
           </p:cNvPr>
@@ -5707,7 +5656,7 @@
           <a:p>
             <a:fld id="{E389AA9D-A245-8245-B1FA-F343E2C3F01D}" type="datetimeFigureOut">
               <a:rPr lang="en-US" smtClean="0"/>
-              <a:t>10/11/20</a:t>
+              <a:t>11/16/20</a:t>
             </a:fld>
             <a:endParaRPr lang="en-US"/>
           </a:p>
@@ -5718,7 +5667,7 @@
           <p:cNvPr id="3" name="Footer Placeholder 2">
             <a:extLst>
               <a:ext uri="{FF2B5EF4-FFF2-40B4-BE49-F238E27FC236}">
-                <a16:creationId xmlns="" xmlns:a16="http://schemas.microsoft.com/office/drawing/2014/main" id="{32793365-CEC5-8C42-8428-5056757A25D2}"/>
+                <a16:creationId xmlns:a16="http://schemas.microsoft.com/office/drawing/2014/main" xmlns="" id="{32793365-CEC5-8C42-8428-5056757A25D2}"/>
               </a:ext>
             </a:extLst>
           </p:cNvPr>
@@ -5743,7 +5692,7 @@
           <p:cNvPr id="4" name="Slide Number Placeholder 3">
             <a:extLst>
               <a:ext uri="{FF2B5EF4-FFF2-40B4-BE49-F238E27FC236}">
-                <a16:creationId xmlns="" xmlns:a16="http://schemas.microsoft.com/office/drawing/2014/main" id="{D00C7855-C87E-4840-83B1-11830F68181E}"/>
+                <a16:creationId xmlns:a16="http://schemas.microsoft.com/office/drawing/2014/main" xmlns="" id="{D00C7855-C87E-4840-83B1-11830F68181E}"/>
               </a:ext>
             </a:extLst>
           </p:cNvPr>
@@ -5802,7 +5751,7 @@
           <p:cNvPr id="2" name="Title 1">
             <a:extLst>
               <a:ext uri="{FF2B5EF4-FFF2-40B4-BE49-F238E27FC236}">
-                <a16:creationId xmlns="" xmlns:a16="http://schemas.microsoft.com/office/drawing/2014/main" id="{DAD94EF5-1A70-254F-9102-5FE6EFA0BDEA}"/>
+                <a16:creationId xmlns:a16="http://schemas.microsoft.com/office/drawing/2014/main" xmlns="" id="{DAD94EF5-1A70-254F-9102-5FE6EFA0BDEA}"/>
               </a:ext>
             </a:extLst>
           </p:cNvPr>
@@ -5839,7 +5788,7 @@
           <p:cNvPr id="3" name="Content Placeholder 2">
             <a:extLst>
               <a:ext uri="{FF2B5EF4-FFF2-40B4-BE49-F238E27FC236}">
-                <a16:creationId xmlns="" xmlns:a16="http://schemas.microsoft.com/office/drawing/2014/main" id="{901D4F1D-C81B-9844-9963-18A908182D8C}"/>
+                <a16:creationId xmlns:a16="http://schemas.microsoft.com/office/drawing/2014/main" xmlns="" id="{901D4F1D-C81B-9844-9963-18A908182D8C}"/>
               </a:ext>
             </a:extLst>
           </p:cNvPr>
@@ -5929,7 +5878,7 @@
           <p:cNvPr id="4" name="Text Placeholder 3">
             <a:extLst>
               <a:ext uri="{FF2B5EF4-FFF2-40B4-BE49-F238E27FC236}">
-                <a16:creationId xmlns="" xmlns:a16="http://schemas.microsoft.com/office/drawing/2014/main" id="{3A6F232B-F970-894A-867A-7232BCC5E18F}"/>
+                <a16:creationId xmlns:a16="http://schemas.microsoft.com/office/drawing/2014/main" xmlns="" id="{3A6F232B-F970-894A-867A-7232BCC5E18F}"/>
               </a:ext>
             </a:extLst>
           </p:cNvPr>
@@ -6000,7 +5949,7 @@
           <p:cNvPr id="5" name="Date Placeholder 4">
             <a:extLst>
               <a:ext uri="{FF2B5EF4-FFF2-40B4-BE49-F238E27FC236}">
-                <a16:creationId xmlns="" xmlns:a16="http://schemas.microsoft.com/office/drawing/2014/main" id="{4E48B31E-E93B-F74B-995A-0D05DE3F56F4}"/>
+                <a16:creationId xmlns:a16="http://schemas.microsoft.com/office/drawing/2014/main" xmlns="" id="{4E48B31E-E93B-F74B-995A-0D05DE3F56F4}"/>
               </a:ext>
             </a:extLst>
           </p:cNvPr>
@@ -6018,7 +5967,7 @@
           <a:p>
             <a:fld id="{E389AA9D-A245-8245-B1FA-F343E2C3F01D}" type="datetimeFigureOut">
               <a:rPr lang="en-US" smtClean="0"/>
-              <a:t>10/11/20</a:t>
+              <a:t>11/16/20</a:t>
             </a:fld>
             <a:endParaRPr lang="en-US"/>
           </a:p>
@@ -6029,7 +5978,7 @@
           <p:cNvPr id="6" name="Footer Placeholder 5">
             <a:extLst>
               <a:ext uri="{FF2B5EF4-FFF2-40B4-BE49-F238E27FC236}">
-                <a16:creationId xmlns="" xmlns:a16="http://schemas.microsoft.com/office/drawing/2014/main" id="{87896F04-6893-A044-925C-DFC3F4F3A568}"/>
+                <a16:creationId xmlns:a16="http://schemas.microsoft.com/office/drawing/2014/main" xmlns="" id="{87896F04-6893-A044-925C-DFC3F4F3A568}"/>
               </a:ext>
             </a:extLst>
           </p:cNvPr>
@@ -6054,7 +6003,7 @@
           <p:cNvPr id="7" name="Slide Number Placeholder 6">
             <a:extLst>
               <a:ext uri="{FF2B5EF4-FFF2-40B4-BE49-F238E27FC236}">
-                <a16:creationId xmlns="" xmlns:a16="http://schemas.microsoft.com/office/drawing/2014/main" id="{CB7AF5CC-DFB0-274A-9218-61BE6F040EC4}"/>
+                <a16:creationId xmlns:a16="http://schemas.microsoft.com/office/drawing/2014/main" xmlns="" id="{CB7AF5CC-DFB0-274A-9218-61BE6F040EC4}"/>
               </a:ext>
             </a:extLst>
           </p:cNvPr>
@@ -6113,7 +6062,7 @@
           <p:cNvPr id="2" name="Title 1">
             <a:extLst>
               <a:ext uri="{FF2B5EF4-FFF2-40B4-BE49-F238E27FC236}">
-                <a16:creationId xmlns="" xmlns:a16="http://schemas.microsoft.com/office/drawing/2014/main" id="{CED204D7-5DE2-9646-9AA3-782CD58D96E3}"/>
+                <a16:creationId xmlns:a16="http://schemas.microsoft.com/office/drawing/2014/main" xmlns="" id="{CED204D7-5DE2-9646-9AA3-782CD58D96E3}"/>
               </a:ext>
             </a:extLst>
           </p:cNvPr>
@@ -6150,7 +6099,7 @@
           <p:cNvPr id="3" name="Picture Placeholder 2">
             <a:extLst>
               <a:ext uri="{FF2B5EF4-FFF2-40B4-BE49-F238E27FC236}">
-                <a16:creationId xmlns="" xmlns:a16="http://schemas.microsoft.com/office/drawing/2014/main" id="{B32454CE-BDBD-9D49-B6BE-E73A9D78E211}"/>
+                <a16:creationId xmlns:a16="http://schemas.microsoft.com/office/drawing/2014/main" xmlns="" id="{B32454CE-BDBD-9D49-B6BE-E73A9D78E211}"/>
               </a:ext>
             </a:extLst>
           </p:cNvPr>
@@ -6217,7 +6166,7 @@
           <p:cNvPr id="4" name="Text Placeholder 3">
             <a:extLst>
               <a:ext uri="{FF2B5EF4-FFF2-40B4-BE49-F238E27FC236}">
-                <a16:creationId xmlns="" xmlns:a16="http://schemas.microsoft.com/office/drawing/2014/main" id="{A34D27B6-E809-6C46-BC0A-1CE2B62E586A}"/>
+                <a16:creationId xmlns:a16="http://schemas.microsoft.com/office/drawing/2014/main" xmlns="" id="{A34D27B6-E809-6C46-BC0A-1CE2B62E586A}"/>
               </a:ext>
             </a:extLst>
           </p:cNvPr>
@@ -6288,7 +6237,7 @@
           <p:cNvPr id="5" name="Date Placeholder 4">
             <a:extLst>
               <a:ext uri="{FF2B5EF4-FFF2-40B4-BE49-F238E27FC236}">
-                <a16:creationId xmlns="" xmlns:a16="http://schemas.microsoft.com/office/drawing/2014/main" id="{C0FD6300-54B8-4A4F-AB8D-8DE64E519AD4}"/>
+                <a16:creationId xmlns:a16="http://schemas.microsoft.com/office/drawing/2014/main" xmlns="" id="{C0FD6300-54B8-4A4F-AB8D-8DE64E519AD4}"/>
               </a:ext>
             </a:extLst>
           </p:cNvPr>
@@ -6306,7 +6255,7 @@
           <a:p>
             <a:fld id="{E389AA9D-A245-8245-B1FA-F343E2C3F01D}" type="datetimeFigureOut">
               <a:rPr lang="en-US" smtClean="0"/>
-              <a:t>10/11/20</a:t>
+              <a:t>11/16/20</a:t>
             </a:fld>
             <a:endParaRPr lang="en-US"/>
           </a:p>
@@ -6317,7 +6266,7 @@
           <p:cNvPr id="6" name="Footer Placeholder 5">
             <a:extLst>
               <a:ext uri="{FF2B5EF4-FFF2-40B4-BE49-F238E27FC236}">
-                <a16:creationId xmlns="" xmlns:a16="http://schemas.microsoft.com/office/drawing/2014/main" id="{C6F2C403-04D7-994D-9AA5-BDA08226233A}"/>
+                <a16:creationId xmlns:a16="http://schemas.microsoft.com/office/drawing/2014/main" xmlns="" id="{C6F2C403-04D7-994D-9AA5-BDA08226233A}"/>
               </a:ext>
             </a:extLst>
           </p:cNvPr>
@@ -6342,7 +6291,7 @@
           <p:cNvPr id="7" name="Slide Number Placeholder 6">
             <a:extLst>
               <a:ext uri="{FF2B5EF4-FFF2-40B4-BE49-F238E27FC236}">
-                <a16:creationId xmlns="" xmlns:a16="http://schemas.microsoft.com/office/drawing/2014/main" id="{BF64EF09-531E-0E49-A5A0-F52A47BB2A63}"/>
+                <a16:creationId xmlns:a16="http://schemas.microsoft.com/office/drawing/2014/main" xmlns="" id="{BF64EF09-531E-0E49-A5A0-F52A47BB2A63}"/>
               </a:ext>
             </a:extLst>
           </p:cNvPr>
@@ -6406,7 +6355,7 @@
           <p:cNvPr id="2" name="Title Placeholder 1">
             <a:extLst>
               <a:ext uri="{FF2B5EF4-FFF2-40B4-BE49-F238E27FC236}">
-                <a16:creationId xmlns="" xmlns:a16="http://schemas.microsoft.com/office/drawing/2014/main" id="{97E5194C-F555-614C-A1E3-2421C7241E30}"/>
+                <a16:creationId xmlns:a16="http://schemas.microsoft.com/office/drawing/2014/main" xmlns="" id="{97E5194C-F555-614C-A1E3-2421C7241E30}"/>
               </a:ext>
             </a:extLst>
           </p:cNvPr>
@@ -6444,7 +6393,7 @@
           <p:cNvPr id="3" name="Text Placeholder 2">
             <a:extLst>
               <a:ext uri="{FF2B5EF4-FFF2-40B4-BE49-F238E27FC236}">
-                <a16:creationId xmlns="" xmlns:a16="http://schemas.microsoft.com/office/drawing/2014/main" id="{5C568EF9-6FB8-FF4C-9D8C-86BCB8DF7A81}"/>
+                <a16:creationId xmlns:a16="http://schemas.microsoft.com/office/drawing/2014/main" xmlns="" id="{5C568EF9-6FB8-FF4C-9D8C-86BCB8DF7A81}"/>
               </a:ext>
             </a:extLst>
           </p:cNvPr>
@@ -6511,7 +6460,7 @@
           <p:cNvPr id="4" name="Date Placeholder 3">
             <a:extLst>
               <a:ext uri="{FF2B5EF4-FFF2-40B4-BE49-F238E27FC236}">
-                <a16:creationId xmlns="" xmlns:a16="http://schemas.microsoft.com/office/drawing/2014/main" id="{8171FAA0-A6FC-C244-AE5D-4FDCA5BEBBB4}"/>
+                <a16:creationId xmlns:a16="http://schemas.microsoft.com/office/drawing/2014/main" xmlns="" id="{8171FAA0-A6FC-C244-AE5D-4FDCA5BEBBB4}"/>
               </a:ext>
             </a:extLst>
           </p:cNvPr>
@@ -6547,7 +6496,7 @@
           <a:p>
             <a:fld id="{E389AA9D-A245-8245-B1FA-F343E2C3F01D}" type="datetimeFigureOut">
               <a:rPr lang="en-US" smtClean="0"/>
-              <a:t>10/11/20</a:t>
+              <a:t>11/16/20</a:t>
             </a:fld>
             <a:endParaRPr lang="en-US"/>
           </a:p>
@@ -6558,7 +6507,7 @@
           <p:cNvPr id="5" name="Footer Placeholder 4">
             <a:extLst>
               <a:ext uri="{FF2B5EF4-FFF2-40B4-BE49-F238E27FC236}">
-                <a16:creationId xmlns="" xmlns:a16="http://schemas.microsoft.com/office/drawing/2014/main" id="{EE18D8E6-A126-8647-AC17-43DE5789C363}"/>
+                <a16:creationId xmlns:a16="http://schemas.microsoft.com/office/drawing/2014/main" xmlns="" id="{EE18D8E6-A126-8647-AC17-43DE5789C363}"/>
               </a:ext>
             </a:extLst>
           </p:cNvPr>
@@ -6601,7 +6550,7 @@
           <p:cNvPr id="6" name="Slide Number Placeholder 5">
             <a:extLst>
               <a:ext uri="{FF2B5EF4-FFF2-40B4-BE49-F238E27FC236}">
-                <a16:creationId xmlns="" xmlns:a16="http://schemas.microsoft.com/office/drawing/2014/main" id="{8BE2B199-0B49-644B-8D17-0A32406C5981}"/>
+                <a16:creationId xmlns:a16="http://schemas.microsoft.com/office/drawing/2014/main" xmlns="" id="{8BE2B199-0B49-644B-8D17-0A32406C5981}"/>
               </a:ext>
             </a:extLst>
           </p:cNvPr>
@@ -7107,7 +7056,7 @@
                 <a:sym typeface="Arial"/>
               </a:rPr>
               <a:pPr/>
-              <a:t>10/11/20</a:t>
+              <a:t>11/16/20</a:t>
             </a:fld>
             <a:endParaRPr lang="en-US">
               <a:solidFill>
@@ -7828,23 +7777,7 @@
                 <a:ea typeface="Times New Roman" charset="0"/>
                 <a:cs typeface="Times New Roman" charset="0"/>
               </a:rPr>
-              <a:t>CC </a:t>
-            </a:r>
-            <a:r>
-              <a:rPr lang="en-US" sz="2800" dirty="0">
-                <a:latin typeface="Times New Roman" charset="0"/>
-                <a:ea typeface="Times New Roman" charset="0"/>
-                <a:cs typeface="Times New Roman" charset="0"/>
-              </a:rPr>
-              <a:t>BY-SA </a:t>
-            </a:r>
-            <a:r>
-              <a:rPr lang="en-US" sz="2800" dirty="0">
-                <a:latin typeface="Times New Roman" charset="0"/>
-                <a:ea typeface="Times New Roman" charset="0"/>
-                <a:cs typeface="Times New Roman" charset="0"/>
-              </a:rPr>
-              <a:t>4.0. To view a copy of this license, visit </a:t>
+              <a:t>CC BY-SA 4.0. To view a copy of this license, visit </a:t>
             </a:r>
             <a:r>
               <a:rPr lang="en-US" sz="2800" dirty="0">
@@ -7853,16 +7786,7 @@
                 <a:cs typeface="Times New Roman" charset="0"/>
                 <a:hlinkClick r:id="rId2"/>
               </a:rPr>
-              <a:t>https://</a:t>
-            </a:r>
-            <a:r>
-              <a:rPr lang="en-US" sz="2800" dirty="0">
-                <a:latin typeface="Times New Roman" charset="0"/>
-                <a:ea typeface="Times New Roman" charset="0"/>
-                <a:cs typeface="Times New Roman" charset="0"/>
-                <a:hlinkClick r:id="rId2"/>
-              </a:rPr>
-              <a:t>creativecommons.org/licenses/by-sa/4.0</a:t>
+              <a:t>https://creativecommons.org/licenses/by-sa/4.0</a:t>
             </a:r>
             <a:r>
               <a:rPr lang="en-US" sz="2800" dirty="0">
@@ -8048,7 +7972,7 @@
           <p:cNvPr id="2" name="Title 1">
             <a:extLst>
               <a:ext uri="{FF2B5EF4-FFF2-40B4-BE49-F238E27FC236}">
-                <a16:creationId xmlns="" xmlns:a16="http://schemas.microsoft.com/office/drawing/2014/main" id="{95D21527-C946-AA4A-A86B-64672A9C4062}"/>
+                <a16:creationId xmlns:a16="http://schemas.microsoft.com/office/drawing/2014/main" xmlns="" id="{95D21527-C946-AA4A-A86B-64672A9C4062}"/>
               </a:ext>
             </a:extLst>
           </p:cNvPr>
@@ -8080,7 +8004,7 @@
           <p:cNvPr id="3" name="Content Placeholder 2">
             <a:extLst>
               <a:ext uri="{FF2B5EF4-FFF2-40B4-BE49-F238E27FC236}">
-                <a16:creationId xmlns="" xmlns:a16="http://schemas.microsoft.com/office/drawing/2014/main" id="{0C25DB49-A89F-5B4E-AD0A-943BBE5D864B}"/>
+                <a16:creationId xmlns:a16="http://schemas.microsoft.com/office/drawing/2014/main" xmlns="" id="{0C25DB49-A89F-5B4E-AD0A-943BBE5D864B}"/>
               </a:ext>
             </a:extLst>
           </p:cNvPr>
@@ -8159,7 +8083,7 @@
           <p:cNvPr id="2" name="Title 1">
             <a:extLst>
               <a:ext uri="{FF2B5EF4-FFF2-40B4-BE49-F238E27FC236}">
-                <a16:creationId xmlns="" xmlns:a16="http://schemas.microsoft.com/office/drawing/2014/main" id="{6B80C641-2826-EA40-96C2-AC7D61132915}"/>
+                <a16:creationId xmlns:a16="http://schemas.microsoft.com/office/drawing/2014/main" xmlns="" id="{6B80C641-2826-EA40-96C2-AC7D61132915}"/>
               </a:ext>
             </a:extLst>
           </p:cNvPr>
@@ -8187,7 +8111,7 @@
           <p:cNvPr id="3" name="Content Placeholder 2">
             <a:extLst>
               <a:ext uri="{FF2B5EF4-FFF2-40B4-BE49-F238E27FC236}">
-                <a16:creationId xmlns="" xmlns:a16="http://schemas.microsoft.com/office/drawing/2014/main" id="{1B7A09BD-F786-5F42-93F6-4659653DCA06}"/>
+                <a16:creationId xmlns:a16="http://schemas.microsoft.com/office/drawing/2014/main" xmlns="" id="{1B7A09BD-F786-5F42-93F6-4659653DCA06}"/>
               </a:ext>
             </a:extLst>
           </p:cNvPr>
@@ -8238,7 +8162,7 @@
           <p:cNvPr id="4" name="image11.jpg">
             <a:extLst>
               <a:ext uri="{FF2B5EF4-FFF2-40B4-BE49-F238E27FC236}">
-                <a16:creationId xmlns="" xmlns:a16="http://schemas.microsoft.com/office/drawing/2014/main" id="{CBB09214-24FF-EE40-9887-76F1051A24A0}"/>
+                <a16:creationId xmlns:a16="http://schemas.microsoft.com/office/drawing/2014/main" xmlns="" id="{CBB09214-24FF-EE40-9887-76F1051A24A0}"/>
               </a:ext>
             </a:extLst>
           </p:cNvPr>
@@ -8268,7 +8192,7 @@
           <p:cNvPr id="5" name="TextBox 4">
             <a:extLst>
               <a:ext uri="{FF2B5EF4-FFF2-40B4-BE49-F238E27FC236}">
-                <a16:creationId xmlns="" xmlns:a16="http://schemas.microsoft.com/office/drawing/2014/main" id="{152D77FD-82C1-5047-89B4-8DC88C35AFE0}"/>
+                <a16:creationId xmlns:a16="http://schemas.microsoft.com/office/drawing/2014/main" xmlns="" id="{152D77FD-82C1-5047-89B4-8DC88C35AFE0}"/>
               </a:ext>
             </a:extLst>
           </p:cNvPr>
@@ -8309,7 +8233,7 @@
           <p:cNvPr id="6" name="TextBox 5">
             <a:extLst>
               <a:ext uri="{FF2B5EF4-FFF2-40B4-BE49-F238E27FC236}">
-                <a16:creationId xmlns="" xmlns:a16="http://schemas.microsoft.com/office/drawing/2014/main" id="{54AF32F3-3F93-1348-A4E9-7763756F8567}"/>
+                <a16:creationId xmlns:a16="http://schemas.microsoft.com/office/drawing/2014/main" xmlns="" id="{54AF32F3-3F93-1348-A4E9-7763756F8567}"/>
               </a:ext>
             </a:extLst>
           </p:cNvPr>
@@ -8381,7 +8305,7 @@
           <p:cNvPr id="2" name="Title 1">
             <a:extLst>
               <a:ext uri="{FF2B5EF4-FFF2-40B4-BE49-F238E27FC236}">
-                <a16:creationId xmlns="" xmlns:a16="http://schemas.microsoft.com/office/drawing/2014/main" id="{3777F6A6-10FF-D948-A97C-D7D5FC234AFF}"/>
+                <a16:creationId xmlns:a16="http://schemas.microsoft.com/office/drawing/2014/main" xmlns="" id="{3777F6A6-10FF-D948-A97C-D7D5FC234AFF}"/>
               </a:ext>
             </a:extLst>
           </p:cNvPr>
@@ -8409,7 +8333,7 @@
           <p:cNvPr id="3" name="Content Placeholder 2">
             <a:extLst>
               <a:ext uri="{FF2B5EF4-FFF2-40B4-BE49-F238E27FC236}">
-                <a16:creationId xmlns="" xmlns:a16="http://schemas.microsoft.com/office/drawing/2014/main" id="{9B1C5DFF-3BAA-504D-8C7B-6B24939B056F}"/>
+                <a16:creationId xmlns:a16="http://schemas.microsoft.com/office/drawing/2014/main" xmlns="" id="{9B1C5DFF-3BAA-504D-8C7B-6B24939B056F}"/>
               </a:ext>
             </a:extLst>
           </p:cNvPr>
@@ -8496,7 +8420,7 @@
           <p:cNvPr id="2" name="Title 1">
             <a:extLst>
               <a:ext uri="{FF2B5EF4-FFF2-40B4-BE49-F238E27FC236}">
-                <a16:creationId xmlns="" xmlns:a16="http://schemas.microsoft.com/office/drawing/2014/main" id="{815A418C-CE0D-6843-BD08-8663DD324EEE}"/>
+                <a16:creationId xmlns:a16="http://schemas.microsoft.com/office/drawing/2014/main" xmlns="" id="{815A418C-CE0D-6843-BD08-8663DD324EEE}"/>
               </a:ext>
             </a:extLst>
           </p:cNvPr>
@@ -8524,7 +8448,7 @@
           <p:cNvPr id="4" name="Content Placeholder 3">
             <a:extLst>
               <a:ext uri="{FF2B5EF4-FFF2-40B4-BE49-F238E27FC236}">
-                <a16:creationId xmlns="" xmlns:a16="http://schemas.microsoft.com/office/drawing/2014/main" id="{D146D73B-D740-4D4C-8C00-FA96CB3B5BDA}"/>
+                <a16:creationId xmlns:a16="http://schemas.microsoft.com/office/drawing/2014/main" xmlns="" id="{D146D73B-D740-4D4C-8C00-FA96CB3B5BDA}"/>
               </a:ext>
             </a:extLst>
           </p:cNvPr>
@@ -8598,34 +8522,146 @@
       </p:sp>
       <p:pic>
         <p:nvPicPr>
-          <p:cNvPr id="6" name="image10.png">
-            <a:extLst>
-              <a:ext uri="{FF2B5EF4-FFF2-40B4-BE49-F238E27FC236}">
-                <a16:creationId xmlns="" xmlns:a16="http://schemas.microsoft.com/office/drawing/2014/main" id="{87B7ECC4-4F76-0747-85F8-A09931904905}"/>
-              </a:ext>
-            </a:extLst>
-          </p:cNvPr>
-          <p:cNvPicPr/>
+          <p:cNvPr id="1026" name="Picture 2" descr="ile:Andromeda Galaxy (with h-alpha).jpg"/>
+          <p:cNvPicPr>
+            <a:picLocks noChangeAspect="1" noChangeArrowheads="1"/>
+          </p:cNvPicPr>
           <p:nvPr/>
         </p:nvPicPr>
         <p:blipFill>
-          <a:blip r:embed="rId3"/>
+          <a:blip r:embed="rId3">
+            <a:extLst>
+              <a:ext uri="{28A0092B-C50C-407E-A947-70E740481C1C}">
+                <a14:useLocalDpi xmlns:a14="http://schemas.microsoft.com/office/drawing/2010/main" val="0"/>
+              </a:ext>
+            </a:extLst>
+          </a:blip>
           <a:srcRect/>
           <a:stretch>
             <a:fillRect/>
           </a:stretch>
         </p:blipFill>
-        <p:spPr>
+        <p:spPr bwMode="auto">
           <a:xfrm>
-            <a:off x="6490334" y="1825624"/>
-            <a:ext cx="4711065" cy="3832225"/>
+            <a:off x="6330462" y="1825625"/>
+            <a:ext cx="5023338" cy="3302844"/>
           </a:xfrm>
           <a:prstGeom prst="rect">
             <a:avLst/>
           </a:prstGeom>
-          <a:ln/>
+          <a:noFill/>
+          <a:extLst>
+            <a:ext uri="{909E8E84-426E-40DD-AFC4-6F175D3DCCD1}">
+              <a14:hiddenFill xmlns:a14="http://schemas.microsoft.com/office/drawing/2010/main">
+                <a:solidFill>
+                  <a:srgbClr val="FFFFFF"/>
+                </a:solidFill>
+              </a14:hiddenFill>
+            </a:ext>
+          </a:extLst>
         </p:spPr>
       </p:pic>
+      <p:sp>
+        <p:nvSpPr>
+          <p:cNvPr id="7" name="Google Shape;114;p16"/>
+          <p:cNvSpPr txBox="1"/>
+          <p:nvPr/>
+        </p:nvSpPr>
+        <p:spPr>
+          <a:xfrm>
+            <a:off x="6248400" y="5128469"/>
+            <a:ext cx="5105400" cy="705765"/>
+          </a:xfrm>
+          <a:prstGeom prst="rect">
+            <a:avLst/>
+          </a:prstGeom>
+          <a:noFill/>
+          <a:ln>
+            <a:noFill/>
+          </a:ln>
+        </p:spPr>
+        <p:txBody>
+          <a:bodyPr spcFirstLastPara="1" wrap="square" lIns="91425" tIns="91425" rIns="91425" bIns="91425" anchor="t" anchorCtr="0">
+            <a:noAutofit/>
+          </a:bodyPr>
+          <a:lstStyle/>
+          <a:p>
+            <a:pPr lvl="0"/>
+            <a:r>
+              <a:rPr lang="en-US" sz="1200" dirty="0" smtClean="0">
+                <a:latin typeface="Roboto"/>
+                <a:ea typeface="Roboto"/>
+                <a:cs typeface="Roboto"/>
+                <a:sym typeface="Roboto"/>
+              </a:rPr>
+              <a:t>Image: </a:t>
+            </a:r>
+            <a:r>
+              <a:rPr lang="en-US" sz="1200" dirty="0" smtClean="0">
+                <a:latin typeface="Roboto"/>
+                <a:ea typeface="Roboto"/>
+                <a:cs typeface="Roboto"/>
+                <a:sym typeface="Roboto"/>
+                <a:hlinkClick r:id="rId4"/>
+              </a:rPr>
+              <a:t>M31, the Andromeda Galaxy (now with h-alpha)</a:t>
+            </a:r>
+            <a:r>
+              <a:rPr lang="en-US" sz="1200" dirty="0" smtClean="0">
+                <a:latin typeface="Roboto"/>
+                <a:ea typeface="Roboto"/>
+                <a:cs typeface="Roboto"/>
+                <a:sym typeface="Roboto"/>
+              </a:rPr>
+              <a:t> by </a:t>
+            </a:r>
+            <a:r>
+              <a:rPr lang="en-US" sz="1200" dirty="0" smtClean="0">
+                <a:latin typeface="Roboto"/>
+                <a:ea typeface="Roboto"/>
+                <a:cs typeface="Roboto"/>
+                <a:sym typeface="Roboto"/>
+                <a:hlinkClick r:id="rId5"/>
+              </a:rPr>
+              <a:t>Adam Evans</a:t>
+            </a:r>
+            <a:r>
+              <a:rPr lang="en-US" sz="1200" dirty="0" smtClean="0">
+                <a:latin typeface="Roboto"/>
+                <a:ea typeface="Roboto"/>
+                <a:cs typeface="Roboto"/>
+                <a:sym typeface="Roboto"/>
+              </a:rPr>
+              <a:t> </a:t>
+            </a:r>
+            <a:r>
+              <a:rPr lang="en-US" sz="1200" dirty="0" smtClean="0">
+                <a:latin typeface="Roboto"/>
+                <a:ea typeface="Roboto"/>
+                <a:cs typeface="Roboto"/>
+                <a:sym typeface="Roboto"/>
+              </a:rPr>
+              <a:t>is licensed under </a:t>
+            </a:r>
+            <a:r>
+              <a:rPr lang="mr-IN" sz="1200" dirty="0" smtClean="0">
+                <a:latin typeface="Roboto"/>
+                <a:ea typeface="Roboto"/>
+                <a:cs typeface="Roboto"/>
+                <a:sym typeface="Roboto"/>
+                <a:hlinkClick r:id="rId6"/>
+              </a:rPr>
+              <a:t>CC BY-SA 3.0</a:t>
+            </a:r>
+            <a:endParaRPr sz="1200" dirty="0">
+              <a:latin typeface="Roboto"/>
+              <a:ea typeface="Roboto"/>
+              <a:cs typeface="Roboto"/>
+              <a:sym typeface="Roboto"/>
+            </a:endParaRPr>
+          </a:p>
+        </p:txBody>
+      </p:sp>
     </p:spTree>
     <p:extLst>
       <p:ext uri="{BB962C8B-B14F-4D97-AF65-F5344CB8AC3E}">
@@ -8661,7 +8697,7 @@
           <p:cNvPr id="2" name="Title 1">
             <a:extLst>
               <a:ext uri="{FF2B5EF4-FFF2-40B4-BE49-F238E27FC236}">
-                <a16:creationId xmlns="" xmlns:a16="http://schemas.microsoft.com/office/drawing/2014/main" id="{6A3515B8-2697-0846-9963-9F933047D5EB}"/>
+                <a16:creationId xmlns:a16="http://schemas.microsoft.com/office/drawing/2014/main" xmlns="" id="{6A3515B8-2697-0846-9963-9F933047D5EB}"/>
               </a:ext>
             </a:extLst>
           </p:cNvPr>
@@ -8689,7 +8725,7 @@
           <p:cNvPr id="3" name="Content Placeholder 2">
             <a:extLst>
               <a:ext uri="{FF2B5EF4-FFF2-40B4-BE49-F238E27FC236}">
-                <a16:creationId xmlns="" xmlns:a16="http://schemas.microsoft.com/office/drawing/2014/main" id="{C8ACE87D-CECF-924B-95A7-B8962E469AFA}"/>
+                <a16:creationId xmlns:a16="http://schemas.microsoft.com/office/drawing/2014/main" xmlns="" id="{C8ACE87D-CECF-924B-95A7-B8962E469AFA}"/>
               </a:ext>
             </a:extLst>
           </p:cNvPr>
@@ -8753,7 +8789,7 @@
           <p:cNvPr id="2" name="Title 1">
             <a:extLst>
               <a:ext uri="{FF2B5EF4-FFF2-40B4-BE49-F238E27FC236}">
-                <a16:creationId xmlns="" xmlns:a16="http://schemas.microsoft.com/office/drawing/2014/main" id="{5EEE1811-4B8A-8440-8ACA-FBEDC727DF34}"/>
+                <a16:creationId xmlns:a16="http://schemas.microsoft.com/office/drawing/2014/main" xmlns="" id="{5EEE1811-4B8A-8440-8ACA-FBEDC727DF34}"/>
               </a:ext>
             </a:extLst>
           </p:cNvPr>
@@ -8781,7 +8817,7 @@
           <p:cNvPr id="3" name="Content Placeholder 2">
             <a:extLst>
               <a:ext uri="{FF2B5EF4-FFF2-40B4-BE49-F238E27FC236}">
-                <a16:creationId xmlns="" xmlns:a16="http://schemas.microsoft.com/office/drawing/2014/main" id="{ADB45017-CE2B-B543-AD5C-EEDAAA6D88CF}"/>
+                <a16:creationId xmlns:a16="http://schemas.microsoft.com/office/drawing/2014/main" xmlns="" id="{ADB45017-CE2B-B543-AD5C-EEDAAA6D88CF}"/>
               </a:ext>
             </a:extLst>
           </p:cNvPr>
@@ -8831,7 +8867,7 @@
           <p:cNvPr id="5" name="Rectangle 4">
             <a:extLst>
               <a:ext uri="{FF2B5EF4-FFF2-40B4-BE49-F238E27FC236}">
-                <a16:creationId xmlns="" xmlns:a16="http://schemas.microsoft.com/office/drawing/2014/main" id="{27AAB4D5-2A5C-3940-A7A9-7FE1CBF0250D}"/>
+                <a16:creationId xmlns:a16="http://schemas.microsoft.com/office/drawing/2014/main" xmlns="" id="{27AAB4D5-2A5C-3940-A7A9-7FE1CBF0250D}"/>
               </a:ext>
             </a:extLst>
           </p:cNvPr>
@@ -8888,7 +8924,7 @@
           <p:cNvPr id="7" name="Rectangle 6">
             <a:extLst>
               <a:ext uri="{FF2B5EF4-FFF2-40B4-BE49-F238E27FC236}">
-                <a16:creationId xmlns="" xmlns:a16="http://schemas.microsoft.com/office/drawing/2014/main" id="{8EF7996A-AABC-9C42-A76C-CA219B4DE974}"/>
+                <a16:creationId xmlns:a16="http://schemas.microsoft.com/office/drawing/2014/main" xmlns="" id="{8EF7996A-AABC-9C42-A76C-CA219B4DE974}"/>
               </a:ext>
             </a:extLst>
           </p:cNvPr>
@@ -8937,7 +8973,7 @@
           <p:cNvPr id="8" name="Rectangle 7">
             <a:extLst>
               <a:ext uri="{FF2B5EF4-FFF2-40B4-BE49-F238E27FC236}">
-                <a16:creationId xmlns="" xmlns:a16="http://schemas.microsoft.com/office/drawing/2014/main" id="{E464FC21-9604-A143-872D-B7B08A9DAA9F}"/>
+                <a16:creationId xmlns:a16="http://schemas.microsoft.com/office/drawing/2014/main" xmlns="" id="{E464FC21-9604-A143-872D-B7B08A9DAA9F}"/>
               </a:ext>
             </a:extLst>
           </p:cNvPr>
@@ -8994,7 +9030,7 @@
           <p:cNvPr id="9" name="Rectangle 8">
             <a:extLst>
               <a:ext uri="{FF2B5EF4-FFF2-40B4-BE49-F238E27FC236}">
-                <a16:creationId xmlns="" xmlns:a16="http://schemas.microsoft.com/office/drawing/2014/main" id="{0CF0AA78-AA68-0040-8F06-9F19EBEEA09F}"/>
+                <a16:creationId xmlns:a16="http://schemas.microsoft.com/office/drawing/2014/main" xmlns="" id="{0CF0AA78-AA68-0040-8F06-9F19EBEEA09F}"/>
               </a:ext>
             </a:extLst>
           </p:cNvPr>
@@ -9043,7 +9079,7 @@
           <p:cNvPr id="10" name="TextBox 9">
             <a:extLst>
               <a:ext uri="{FF2B5EF4-FFF2-40B4-BE49-F238E27FC236}">
-                <a16:creationId xmlns="" xmlns:a16="http://schemas.microsoft.com/office/drawing/2014/main" id="{DA0F844B-4EEE-D742-8C02-F5C88A2DECD2}"/>
+                <a16:creationId xmlns:a16="http://schemas.microsoft.com/office/drawing/2014/main" xmlns="" id="{DA0F844B-4EEE-D742-8C02-F5C88A2DECD2}"/>
               </a:ext>
             </a:extLst>
           </p:cNvPr>
@@ -9109,7 +9145,7 @@
           <p:cNvPr id="2" name="Title 1">
             <a:extLst>
               <a:ext uri="{FF2B5EF4-FFF2-40B4-BE49-F238E27FC236}">
-                <a16:creationId xmlns="" xmlns:a16="http://schemas.microsoft.com/office/drawing/2014/main" id="{FB9BFDEB-DE6A-984A-B311-6B9B650F1C57}"/>
+                <a16:creationId xmlns:a16="http://schemas.microsoft.com/office/drawing/2014/main" xmlns="" id="{FB9BFDEB-DE6A-984A-B311-6B9B650F1C57}"/>
               </a:ext>
             </a:extLst>
           </p:cNvPr>
@@ -9137,7 +9173,7 @@
           <p:cNvPr id="5" name="Content Placeholder 4">
             <a:extLst>
               <a:ext uri="{FF2B5EF4-FFF2-40B4-BE49-F238E27FC236}">
-                <a16:creationId xmlns="" xmlns:a16="http://schemas.microsoft.com/office/drawing/2014/main" id="{1E3300B2-A75A-E345-A31B-F6AEF80B18DE}"/>
+                <a16:creationId xmlns:a16="http://schemas.microsoft.com/office/drawing/2014/main" xmlns="" id="{1E3300B2-A75A-E345-A31B-F6AEF80B18DE}"/>
               </a:ext>
             </a:extLst>
           </p:cNvPr>

</xml_diff>